<commit_message>
Change theme colors. Add resume and blurb and masters project
</commit_message>
<xml_diff>
--- a/img/favicon.pptx
+++ b/img/favicon.pptx
@@ -104,6 +104,11 @@
       </a:defRPr>
     </a:lvl9pPr>
   </p:defaultTextStyle>
+  <p:extLst>
+    <p:ext uri="{EFAFB233-063F-42B5-8137-9DF3F51BA10A}">
+      <p15:sldGuideLst xmlns:p15="http://schemas.microsoft.com/office/powerpoint/2012/main"/>
+    </p:ext>
+  </p:extLst>
 </p:presentation>
 </file>
 
@@ -254,7 +259,7 @@
           <a:p>
             <a:fld id="{713A5C27-C1AF-724D-BDD8-1B5B2224533E}" type="datetimeFigureOut">
               <a:rPr lang="en-US" smtClean="0"/>
-              <a:t>5/9/20</a:t>
+              <a:t>7/12/20</a:t>
             </a:fld>
             <a:endParaRPr lang="en-US"/>
           </a:p>
@@ -452,7 +457,7 @@
           <a:p>
             <a:fld id="{713A5C27-C1AF-724D-BDD8-1B5B2224533E}" type="datetimeFigureOut">
               <a:rPr lang="en-US" smtClean="0"/>
-              <a:t>5/9/20</a:t>
+              <a:t>7/12/20</a:t>
             </a:fld>
             <a:endParaRPr lang="en-US"/>
           </a:p>
@@ -660,7 +665,7 @@
           <a:p>
             <a:fld id="{713A5C27-C1AF-724D-BDD8-1B5B2224533E}" type="datetimeFigureOut">
               <a:rPr lang="en-US" smtClean="0"/>
-              <a:t>5/9/20</a:t>
+              <a:t>7/12/20</a:t>
             </a:fld>
             <a:endParaRPr lang="en-US"/>
           </a:p>
@@ -858,7 +863,7 @@
           <a:p>
             <a:fld id="{713A5C27-C1AF-724D-BDD8-1B5B2224533E}" type="datetimeFigureOut">
               <a:rPr lang="en-US" smtClean="0"/>
-              <a:t>5/9/20</a:t>
+              <a:t>7/12/20</a:t>
             </a:fld>
             <a:endParaRPr lang="en-US"/>
           </a:p>
@@ -1133,7 +1138,7 @@
           <a:p>
             <a:fld id="{713A5C27-C1AF-724D-BDD8-1B5B2224533E}" type="datetimeFigureOut">
               <a:rPr lang="en-US" smtClean="0"/>
-              <a:t>5/9/20</a:t>
+              <a:t>7/12/20</a:t>
             </a:fld>
             <a:endParaRPr lang="en-US"/>
           </a:p>
@@ -1398,7 +1403,7 @@
           <a:p>
             <a:fld id="{713A5C27-C1AF-724D-BDD8-1B5B2224533E}" type="datetimeFigureOut">
               <a:rPr lang="en-US" smtClean="0"/>
-              <a:t>5/9/20</a:t>
+              <a:t>7/12/20</a:t>
             </a:fld>
             <a:endParaRPr lang="en-US"/>
           </a:p>
@@ -1810,7 +1815,7 @@
           <a:p>
             <a:fld id="{713A5C27-C1AF-724D-BDD8-1B5B2224533E}" type="datetimeFigureOut">
               <a:rPr lang="en-US" smtClean="0"/>
-              <a:t>5/9/20</a:t>
+              <a:t>7/12/20</a:t>
             </a:fld>
             <a:endParaRPr lang="en-US"/>
           </a:p>
@@ -1951,7 +1956,7 @@
           <a:p>
             <a:fld id="{713A5C27-C1AF-724D-BDD8-1B5B2224533E}" type="datetimeFigureOut">
               <a:rPr lang="en-US" smtClean="0"/>
-              <a:t>5/9/20</a:t>
+              <a:t>7/12/20</a:t>
             </a:fld>
             <a:endParaRPr lang="en-US"/>
           </a:p>
@@ -2064,7 +2069,7 @@
           <a:p>
             <a:fld id="{713A5C27-C1AF-724D-BDD8-1B5B2224533E}" type="datetimeFigureOut">
               <a:rPr lang="en-US" smtClean="0"/>
-              <a:t>5/9/20</a:t>
+              <a:t>7/12/20</a:t>
             </a:fld>
             <a:endParaRPr lang="en-US"/>
           </a:p>
@@ -2375,7 +2380,7 @@
           <a:p>
             <a:fld id="{713A5C27-C1AF-724D-BDD8-1B5B2224533E}" type="datetimeFigureOut">
               <a:rPr lang="en-US" smtClean="0"/>
-              <a:t>5/9/20</a:t>
+              <a:t>7/12/20</a:t>
             </a:fld>
             <a:endParaRPr lang="en-US"/>
           </a:p>
@@ -2663,7 +2668,7 @@
           <a:p>
             <a:fld id="{713A5C27-C1AF-724D-BDD8-1B5B2224533E}" type="datetimeFigureOut">
               <a:rPr lang="en-US" smtClean="0"/>
-              <a:t>5/9/20</a:t>
+              <a:t>7/12/20</a:t>
             </a:fld>
             <a:endParaRPr lang="en-US"/>
           </a:p>
@@ -2904,7 +2909,7 @@
           <a:p>
             <a:fld id="{713A5C27-C1AF-724D-BDD8-1B5B2224533E}" type="datetimeFigureOut">
               <a:rPr lang="en-US" smtClean="0"/>
-              <a:t>5/9/20</a:t>
+              <a:t>7/12/20</a:t>
             </a:fld>
             <a:endParaRPr lang="en-US"/>
           </a:p>
@@ -3335,8 +3340,8 @@
         </p:nvSpPr>
         <p:spPr>
           <a:xfrm>
-            <a:off x="5513949" y="2155371"/>
-            <a:ext cx="1997194" cy="923330"/>
+            <a:off x="5513950" y="2155371"/>
+            <a:ext cx="1220406" cy="923330"/>
           </a:xfrm>
           <a:prstGeom prst="rect">
             <a:avLst/>
@@ -3345,6 +3350,11 @@
           <a:ln>
             <a:noFill/>
           </a:ln>
+          <a:effectLst>
+            <a:outerShdw blurRad="50800" dist="50800" dir="5400000" algn="ctr" rotWithShape="0">
+              <a:schemeClr val="bg1"/>
+            </a:outerShdw>
+          </a:effectLst>
         </p:spPr>
         <p:txBody>
           <a:bodyPr wrap="square" lIns="91440" tIns="45720" rIns="91440" bIns="45720">
@@ -3357,12 +3367,12 @@
               <a:rPr lang="en-US" sz="5400" b="1" cap="none" spc="0" dirty="0">
                 <a:ln w="9525">
                   <a:solidFill>
-                    <a:srgbClr val="7030A0"/>
+                    <a:srgbClr val="002060"/>
                   </a:solidFill>
                   <a:prstDash val="solid"/>
                 </a:ln>
                 <a:solidFill>
-                  <a:srgbClr val="CD54E8"/>
+                  <a:srgbClr val="002060"/>
                 </a:solidFill>
                 <a:effectLst>
                   <a:outerShdw blurRad="50800" dist="38100" dir="2700000" algn="tl" rotWithShape="0">
@@ -3374,6 +3384,38 @@
               </a:rPr>
               <a:t>FLP</a:t>
             </a:r>
+          </a:p>
+        </p:txBody>
+      </p:sp>
+      <p:sp>
+        <p:nvSpPr>
+          <p:cNvPr id="2" name="TextBox 1">
+            <a:extLst>
+              <a:ext uri="{FF2B5EF4-FFF2-40B4-BE49-F238E27FC236}">
+                <a16:creationId xmlns:a16="http://schemas.microsoft.com/office/drawing/2014/main" id="{773EBABE-FD58-B24D-AC06-FF4456F64C65}"/>
+              </a:ext>
+            </a:extLst>
+          </p:cNvPr>
+          <p:cNvSpPr txBox="1"/>
+          <p:nvPr/>
+        </p:nvSpPr>
+        <p:spPr>
+          <a:xfrm>
+            <a:off x="5704764" y="3643952"/>
+            <a:ext cx="184731" cy="369332"/>
+          </a:xfrm>
+          <a:prstGeom prst="rect">
+            <a:avLst/>
+          </a:prstGeom>
+          <a:noFill/>
+        </p:spPr>
+        <p:txBody>
+          <a:bodyPr wrap="none" rtlCol="0">
+            <a:spAutoFit/>
+          </a:bodyPr>
+          <a:lstStyle/>
+          <a:p>
+            <a:endParaRPr lang="en-US" dirty="0"/>
           </a:p>
         </p:txBody>
       </p:sp>

</xml_diff>